<commit_message>
Presentation as was given during the mid term exam
</commit_message>
<xml_diff>
--- a/Project/Presentation/Mid_term_presentation.pptx
+++ b/Project/Presentation/Mid_term_presentation.pptx
@@ -290,7 +290,7 @@
             <a:fld id="{17A39E9D-B438-D94D-AF2A-93757548558C}" type="datetime1">
               <a:rPr lang="nl-NL" altLang="nl-NL"/>
               <a:pPr/>
-              <a:t>3-6-2018</a:t>
+              <a:t>4-6-2018</a:t>
             </a:fld>
             <a:endParaRPr lang="nl-NL" altLang="nl-NL"/>
           </a:p>
@@ -502,7 +502,7 @@
             <a:fld id="{3AA95554-0BC3-EC48-BCE0-DB850053191D}" type="datetime1">
               <a:rPr lang="nl-NL" altLang="nl-NL"/>
               <a:pPr/>
-              <a:t>3-6-2018</a:t>
+              <a:t>4-6-2018</a:t>
             </a:fld>
             <a:endParaRPr lang="nl-NL" altLang="nl-NL"/>
           </a:p>
@@ -1025,7 +1025,7 @@
           <a:p>
             <a:fld id="{9E1ED08B-741D-9E48-95DA-82644AB503BC}" type="datetime1">
               <a:rPr lang="nl-NL" altLang="nl-NL" smtClean="0"/>
-              <a:t>3-6-2018</a:t>
+              <a:t>4-6-2018</a:t>
             </a:fld>
             <a:endParaRPr lang="nl-NL" altLang="nl-NL"/>
           </a:p>
@@ -1396,7 +1396,7 @@
             <a:fld id="{9E1ED08B-741D-9E48-95DA-82644AB503BC}" type="datetime1">
               <a:rPr lang="nl-NL" altLang="nl-NL" smtClean="0"/>
               <a:pPr/>
-              <a:t>3-6-2018</a:t>
+              <a:t>4-6-2018</a:t>
             </a:fld>
             <a:endParaRPr lang="nl-NL" altLang="nl-NL" dirty="0"/>
           </a:p>
@@ -1662,7 +1662,7 @@
           <a:p>
             <a:fld id="{46CB0545-8C00-A544-A88F-C33FBC7A7630}" type="datetime1">
               <a:rPr lang="nl-NL" altLang="nl-NL" smtClean="0"/>
-              <a:t>3-6-2018</a:t>
+              <a:t>4-6-2018</a:t>
             </a:fld>
             <a:endParaRPr lang="nl-NL" altLang="nl-NL" dirty="0"/>
           </a:p>
@@ -2056,7 +2056,7 @@
           <a:p>
             <a:fld id="{46CB0545-8C00-A544-A88F-C33FBC7A7630}" type="datetime1">
               <a:rPr lang="nl-NL" altLang="nl-NL" smtClean="0"/>
-              <a:t>3-6-2018</a:t>
+              <a:t>4-6-2018</a:t>
             </a:fld>
             <a:endParaRPr lang="nl-NL" altLang="nl-NL" dirty="0"/>
           </a:p>
@@ -2553,7 +2553,7 @@
             <a:fld id="{B3873A8C-A209-FC40-86BC-D3E9A671FD81}" type="datetime1">
               <a:rPr lang="nl-NL" altLang="nl-NL" smtClean="0"/>
               <a:pPr/>
-              <a:t>3-6-2018</a:t>
+              <a:t>4-6-2018</a:t>
             </a:fld>
             <a:endParaRPr lang="nl-NL" altLang="nl-NL" dirty="0"/>
           </a:p>
@@ -3293,7 +3293,7 @@
             <a:fld id="{FB5CF2AB-20FF-5442-9E53-3C6EDD7FBCEA}" type="datetime1">
               <a:rPr lang="nl-NL" altLang="nl-NL" smtClean="0"/>
               <a:pPr/>
-              <a:t>3-6-2018</a:t>
+              <a:t>4-6-2018</a:t>
             </a:fld>
             <a:endParaRPr lang="nl-NL" altLang="nl-NL" dirty="0"/>
           </a:p>
@@ -4198,7 +4198,6 @@
               <a:rPr lang="nl-NL" dirty="0" smtClean="0"/>
               <a:t>Eh. </a:t>
             </a:r>
-            <a:endParaRPr lang="nl-NL" dirty="0" smtClean="0"/>
           </a:p>
         </p:txBody>
       </p:sp>
@@ -4373,11 +4372,7 @@
             </a:r>
             <a:r>
               <a:rPr lang="nl-NL" dirty="0" smtClean="0"/>
-              <a:t> </a:t>
-            </a:r>
-            <a:r>
-              <a:rPr lang="nl-NL" dirty="0" smtClean="0"/>
-              <a:t>+ </a:t>
+              <a:t> + </a:t>
             </a:r>
             <a:r>
               <a:rPr lang="nl-NL" dirty="0" err="1" smtClean="0"/>
@@ -4443,7 +4438,6 @@
               <a:rPr lang="nl-NL" dirty="0" smtClean="0"/>
               <a:t> background</a:t>
             </a:r>
-            <a:endParaRPr lang="nl-NL" dirty="0" smtClean="0"/>
           </a:p>
         </p:txBody>
       </p:sp>
@@ -4509,11 +4503,7 @@
           <a:p>
             <a:r>
               <a:rPr lang="nl-NL" sz="5400" dirty="0" smtClean="0"/>
-              <a:t>Team Boy </a:t>
-            </a:r>
-            <a:r>
-              <a:rPr lang="nl-NL" sz="5400" dirty="0" smtClean="0"/>
-              <a:t>Band</a:t>
+              <a:t>Team Boy Band</a:t>
             </a:r>
             <a:endParaRPr lang="nl-NL" sz="5400" dirty="0"/>
           </a:p>
@@ -5926,11 +5916,7 @@
             </a:r>
             <a:r>
               <a:rPr lang="nl-NL" dirty="0" smtClean="0"/>
-              <a:t> </a:t>
-            </a:r>
-            <a:r>
-              <a:rPr lang="nl-NL" dirty="0" smtClean="0"/>
-              <a:t>file</a:t>
+              <a:t> file</a:t>
             </a:r>
           </a:p>
           <a:p>
@@ -5948,10 +5934,18 @@
               <a:t> </a:t>
             </a:r>
             <a:r>
-              <a:rPr lang="nl-NL" dirty="0" err="1" smtClean="0"/>
+              <a:rPr lang="nl-NL" dirty="0" err="1" smtClean="0">
+                <a:solidFill>
+                  <a:srgbClr val="FF0000"/>
+                </a:solidFill>
+              </a:rPr>
               <a:t>artifacts</a:t>
             </a:r>
-            <a:endParaRPr lang="nl-NL" dirty="0"/>
+            <a:endParaRPr lang="nl-NL" dirty="0">
+              <a:solidFill>
+                <a:srgbClr val="FF0000"/>
+              </a:solidFill>
+            </a:endParaRPr>
           </a:p>
           <a:p>
             <a:pPr lvl="1"/>
@@ -6363,6 +6357,30 @@
           </a:p>
         </p:txBody>
       </p:sp>
+      <p:pic>
+        <p:nvPicPr>
+          <p:cNvPr id="2" name="Picture 1"/>
+          <p:cNvPicPr>
+            <a:picLocks noChangeAspect="1"/>
+          </p:cNvPicPr>
+          <p:nvPr/>
+        </p:nvPicPr>
+        <p:blipFill>
+          <a:blip r:embed="rId2"/>
+          <a:stretch>
+            <a:fillRect/>
+          </a:stretch>
+        </p:blipFill>
+        <p:spPr>
+          <a:xfrm>
+            <a:off x="11941824" y="4685689"/>
+            <a:ext cx="3867150" cy="3409950"/>
+          </a:xfrm>
+          <a:prstGeom prst="rect">
+            <a:avLst/>
+          </a:prstGeom>
+        </p:spPr>
+      </p:pic>
     </p:spTree>
     <p:extLst>
       <p:ext uri="{BB962C8B-B14F-4D97-AF65-F5344CB8AC3E}">
@@ -7667,13 +7685,8 @@
             <a:pPr lvl="1"/>
             <a:r>
               <a:rPr lang="nl-NL" dirty="0" smtClean="0"/>
-              <a:t>The basic </a:t>
-            </a:r>
-            <a:r>
-              <a:rPr lang="nl-NL" dirty="0" smtClean="0"/>
-              <a:t>stuff</a:t>
-            </a:r>
-            <a:endParaRPr lang="nl-NL" dirty="0" smtClean="0"/>
+              <a:t>The basic stuff</a:t>
+            </a:r>
           </a:p>
           <a:p>
             <a:pPr lvl="1"/>
@@ -7820,7 +7833,75 @@
   <p:timing>
     <p:tnLst>
       <p:par>
-        <p:cTn id="1" dur="indefinite" restart="never" nodeType="tmRoot"/>
+        <p:cTn id="1" dur="indefinite" restart="never" nodeType="tmRoot">
+          <p:childTnLst>
+            <p:seq concurrent="1" nextAc="seek">
+              <p:cTn id="2" dur="indefinite" nodeType="mainSeq">
+                <p:childTnLst>
+                  <p:par>
+                    <p:cTn id="3" fill="hold">
+                      <p:stCondLst>
+                        <p:cond delay="indefinite"/>
+                      </p:stCondLst>
+                      <p:childTnLst>
+                        <p:par>
+                          <p:cTn id="4" fill="hold">
+                            <p:stCondLst>
+                              <p:cond delay="0"/>
+                            </p:stCondLst>
+                            <p:childTnLst>
+                              <p:par>
+                                <p:cTn id="5" presetID="1" presetClass="entr" presetSubtype="0" fill="hold" nodeType="clickEffect">
+                                  <p:stCondLst>
+                                    <p:cond delay="0"/>
+                                  </p:stCondLst>
+                                  <p:childTnLst>
+                                    <p:set>
+                                      <p:cBhvr>
+                                        <p:cTn id="6" dur="1" fill="hold">
+                                          <p:stCondLst>
+                                            <p:cond delay="0"/>
+                                          </p:stCondLst>
+                                        </p:cTn>
+                                        <p:tgtEl>
+                                          <p:spTgt spid="3"/>
+                                        </p:tgtEl>
+                                        <p:attrNameLst>
+                                          <p:attrName>style.visibility</p:attrName>
+                                        </p:attrNameLst>
+                                      </p:cBhvr>
+                                      <p:to>
+                                        <p:strVal val="visible"/>
+                                      </p:to>
+                                    </p:set>
+                                  </p:childTnLst>
+                                </p:cTn>
+                              </p:par>
+                            </p:childTnLst>
+                          </p:cTn>
+                        </p:par>
+                      </p:childTnLst>
+                    </p:cTn>
+                  </p:par>
+                </p:childTnLst>
+              </p:cTn>
+              <p:prevCondLst>
+                <p:cond evt="onPrev" delay="0">
+                  <p:tgtEl>
+                    <p:sldTgt/>
+                  </p:tgtEl>
+                </p:cond>
+              </p:prevCondLst>
+              <p:nextCondLst>
+                <p:cond evt="onNext" delay="0">
+                  <p:tgtEl>
+                    <p:sldTgt/>
+                  </p:tgtEl>
+                </p:cond>
+              </p:nextCondLst>
+            </p:seq>
+          </p:childTnLst>
+        </p:cTn>
       </p:par>
     </p:tnLst>
   </p:timing>
@@ -7884,7 +7965,7 @@
         </p:nvSpPr>
         <p:spPr>
           <a:xfrm>
-            <a:off x="919891" y="1799999"/>
+            <a:off x="193060" y="1546301"/>
             <a:ext cx="14889083" cy="7020000"/>
           </a:xfrm>
         </p:spPr>
@@ -7895,7 +7976,20 @@
             <a:pPr marL="605148" lvl="1" indent="0">
               <a:buNone/>
             </a:pPr>
-            <a:endParaRPr lang="nl-NL" i="1" dirty="0" smtClean="0"/>
+            <a:r>
+              <a:rPr lang="nl-NL" b="1" dirty="0" smtClean="0"/>
+              <a:t>2015</a:t>
+            </a:r>
+          </a:p>
+          <a:p>
+            <a:pPr marL="605148" lvl="1" indent="0">
+              <a:buNone/>
+            </a:pPr>
+            <a:r>
+              <a:rPr lang="nl-NL" b="1" dirty="0" smtClean="0"/>
+              <a:t>Uni of Freiburg</a:t>
+            </a:r>
+            <a:endParaRPr lang="nl-NL" b="1" dirty="0"/>
           </a:p>
         </p:txBody>
       </p:sp>

</xml_diff>